<commit_message>
added disjoint classes and other minor updates, also minor updates to the docs
</commit_message>
<xml_diff>
--- a/docs/Prezentare - Ontologia aplicatiilor mobile.pptx
+++ b/docs/Prezentare - Ontologia aplicatiilor mobile.pptx
@@ -6058,7 +6058,7 @@
             </a:pPr>
             <a:r>
               <a:rPr lang="en-GB" sz="1200"/>
-              <a:t>proprietăți de date</a:t>
+              <a:t>proprietăți-atribut</a:t>
             </a:r>
           </a:p>
           <a:p>
@@ -6209,7 +6209,7 @@
             </a:pPr>
             <a:r>
               <a:rPr lang="en-GB" sz="1400"/>
-              <a:t>Proprietățile de date se referă la informațiile despre obiectele individuale. </a:t>
+              <a:t>Proprietățile-atribut se referă la informațiile despre obiectele individuale. </a:t>
             </a:r>
           </a:p>
           <a:p>

</xml_diff>